<commit_message>
Atualizaçao do PowerPoint e adiçao da pasta screenshots
</commit_message>
<xml_diff>
--- a/Projeto_SACI_apresentação1.pptx
+++ b/Projeto_SACI_apresentação1.pptx
@@ -10,7 +10,12 @@
     <p:sldId id="258" r:id="rId4"/>
     <p:sldId id="259" r:id="rId5"/>
     <p:sldId id="260" r:id="rId6"/>
-    <p:sldId id="261" r:id="rId7"/>
+    <p:sldId id="262" r:id="rId7"/>
+    <p:sldId id="263" r:id="rId8"/>
+    <p:sldId id="264" r:id="rId9"/>
+    <p:sldId id="265" r:id="rId10"/>
+    <p:sldId id="266" r:id="rId11"/>
+    <p:sldId id="261" r:id="rId12"/>
   </p:sldIdLst>
   <p:sldSz cx="9144000" cy="6858000" type="screen4x3"/>
   <p:notesSz cx="6858000" cy="9144000"/>
@@ -293,7 +298,8 @@
           <a:p>
             <a:fld id="{0670EBBD-4B13-4AD7-AFB5-92105DCF1B3C}" type="datetimeFigureOut">
               <a:rPr lang="pt-BR" smtClean="0"/>
-              <a:t>19/07/2014</a:t>
+              <a:pPr/>
+              <a:t>20/07/2014</a:t>
             </a:fld>
             <a:endParaRPr lang="pt-BR"/>
           </a:p>
@@ -335,6 +341,7 @@
           <a:p>
             <a:fld id="{A860C3A5-2856-48FF-86AF-DABF9B624B89}" type="slidenum">
               <a:rPr lang="pt-BR" smtClean="0"/>
+              <a:pPr/>
               <a:t>‹nº›</a:t>
             </a:fld>
             <a:endParaRPr lang="pt-BR"/>
@@ -458,7 +465,8 @@
           <a:p>
             <a:fld id="{0670EBBD-4B13-4AD7-AFB5-92105DCF1B3C}" type="datetimeFigureOut">
               <a:rPr lang="pt-BR" smtClean="0"/>
-              <a:t>19/07/2014</a:t>
+              <a:pPr/>
+              <a:t>20/07/2014</a:t>
             </a:fld>
             <a:endParaRPr lang="pt-BR"/>
           </a:p>
@@ -500,6 +508,7 @@
           <a:p>
             <a:fld id="{A860C3A5-2856-48FF-86AF-DABF9B624B89}" type="slidenum">
               <a:rPr lang="pt-BR" smtClean="0"/>
+              <a:pPr/>
               <a:t>‹nº›</a:t>
             </a:fld>
             <a:endParaRPr lang="pt-BR"/>
@@ -633,7 +642,8 @@
           <a:p>
             <a:fld id="{0670EBBD-4B13-4AD7-AFB5-92105DCF1B3C}" type="datetimeFigureOut">
               <a:rPr lang="pt-BR" smtClean="0"/>
-              <a:t>19/07/2014</a:t>
+              <a:pPr/>
+              <a:t>20/07/2014</a:t>
             </a:fld>
             <a:endParaRPr lang="pt-BR"/>
           </a:p>
@@ -675,6 +685,7 @@
           <a:p>
             <a:fld id="{A860C3A5-2856-48FF-86AF-DABF9B624B89}" type="slidenum">
               <a:rPr lang="pt-BR" smtClean="0"/>
+              <a:pPr/>
               <a:t>‹nº›</a:t>
             </a:fld>
             <a:endParaRPr lang="pt-BR"/>
@@ -798,7 +809,8 @@
           <a:p>
             <a:fld id="{0670EBBD-4B13-4AD7-AFB5-92105DCF1B3C}" type="datetimeFigureOut">
               <a:rPr lang="pt-BR" smtClean="0"/>
-              <a:t>19/07/2014</a:t>
+              <a:pPr/>
+              <a:t>20/07/2014</a:t>
             </a:fld>
             <a:endParaRPr lang="pt-BR"/>
           </a:p>
@@ -840,6 +852,7 @@
           <a:p>
             <a:fld id="{A860C3A5-2856-48FF-86AF-DABF9B624B89}" type="slidenum">
               <a:rPr lang="pt-BR" smtClean="0"/>
+              <a:pPr/>
               <a:t>‹nº›</a:t>
             </a:fld>
             <a:endParaRPr lang="pt-BR"/>
@@ -1039,7 +1052,8 @@
           <a:p>
             <a:fld id="{0670EBBD-4B13-4AD7-AFB5-92105DCF1B3C}" type="datetimeFigureOut">
               <a:rPr lang="pt-BR" smtClean="0"/>
-              <a:t>19/07/2014</a:t>
+              <a:pPr/>
+              <a:t>20/07/2014</a:t>
             </a:fld>
             <a:endParaRPr lang="pt-BR"/>
           </a:p>
@@ -1081,6 +1095,7 @@
           <a:p>
             <a:fld id="{A860C3A5-2856-48FF-86AF-DABF9B624B89}" type="slidenum">
               <a:rPr lang="pt-BR" smtClean="0"/>
+              <a:pPr/>
               <a:t>‹nº›</a:t>
             </a:fld>
             <a:endParaRPr lang="pt-BR"/>
@@ -1322,7 +1337,8 @@
           <a:p>
             <a:fld id="{0670EBBD-4B13-4AD7-AFB5-92105DCF1B3C}" type="datetimeFigureOut">
               <a:rPr lang="pt-BR" smtClean="0"/>
-              <a:t>19/07/2014</a:t>
+              <a:pPr/>
+              <a:t>20/07/2014</a:t>
             </a:fld>
             <a:endParaRPr lang="pt-BR"/>
           </a:p>
@@ -1364,6 +1380,7 @@
           <a:p>
             <a:fld id="{A860C3A5-2856-48FF-86AF-DABF9B624B89}" type="slidenum">
               <a:rPr lang="pt-BR" smtClean="0"/>
+              <a:pPr/>
               <a:t>‹nº›</a:t>
             </a:fld>
             <a:endParaRPr lang="pt-BR"/>
@@ -1739,7 +1756,8 @@
           <a:p>
             <a:fld id="{0670EBBD-4B13-4AD7-AFB5-92105DCF1B3C}" type="datetimeFigureOut">
               <a:rPr lang="pt-BR" smtClean="0"/>
-              <a:t>19/07/2014</a:t>
+              <a:pPr/>
+              <a:t>20/07/2014</a:t>
             </a:fld>
             <a:endParaRPr lang="pt-BR"/>
           </a:p>
@@ -1781,6 +1799,7 @@
           <a:p>
             <a:fld id="{A860C3A5-2856-48FF-86AF-DABF9B624B89}" type="slidenum">
               <a:rPr lang="pt-BR" smtClean="0"/>
+              <a:pPr/>
               <a:t>‹nº›</a:t>
             </a:fld>
             <a:endParaRPr lang="pt-BR"/>
@@ -1852,7 +1871,8 @@
           <a:p>
             <a:fld id="{0670EBBD-4B13-4AD7-AFB5-92105DCF1B3C}" type="datetimeFigureOut">
               <a:rPr lang="pt-BR" smtClean="0"/>
-              <a:t>19/07/2014</a:t>
+              <a:pPr/>
+              <a:t>20/07/2014</a:t>
             </a:fld>
             <a:endParaRPr lang="pt-BR"/>
           </a:p>
@@ -1894,6 +1914,7 @@
           <a:p>
             <a:fld id="{A860C3A5-2856-48FF-86AF-DABF9B624B89}" type="slidenum">
               <a:rPr lang="pt-BR" smtClean="0"/>
+              <a:pPr/>
               <a:t>‹nº›</a:t>
             </a:fld>
             <a:endParaRPr lang="pt-BR"/>
@@ -1942,7 +1963,8 @@
           <a:p>
             <a:fld id="{0670EBBD-4B13-4AD7-AFB5-92105DCF1B3C}" type="datetimeFigureOut">
               <a:rPr lang="pt-BR" smtClean="0"/>
-              <a:t>19/07/2014</a:t>
+              <a:pPr/>
+              <a:t>20/07/2014</a:t>
             </a:fld>
             <a:endParaRPr lang="pt-BR"/>
           </a:p>
@@ -1984,6 +2006,7 @@
           <a:p>
             <a:fld id="{A860C3A5-2856-48FF-86AF-DABF9B624B89}" type="slidenum">
               <a:rPr lang="pt-BR" smtClean="0"/>
+              <a:pPr/>
               <a:t>‹nº›</a:t>
             </a:fld>
             <a:endParaRPr lang="pt-BR"/>
@@ -2214,7 +2237,8 @@
           <a:p>
             <a:fld id="{0670EBBD-4B13-4AD7-AFB5-92105DCF1B3C}" type="datetimeFigureOut">
               <a:rPr lang="pt-BR" smtClean="0"/>
-              <a:t>19/07/2014</a:t>
+              <a:pPr/>
+              <a:t>20/07/2014</a:t>
             </a:fld>
             <a:endParaRPr lang="pt-BR"/>
           </a:p>
@@ -2256,6 +2280,7 @@
           <a:p>
             <a:fld id="{A860C3A5-2856-48FF-86AF-DABF9B624B89}" type="slidenum">
               <a:rPr lang="pt-BR" smtClean="0"/>
+              <a:pPr/>
               <a:t>‹nº›</a:t>
             </a:fld>
             <a:endParaRPr lang="pt-BR"/>
@@ -2462,7 +2487,8 @@
           <a:p>
             <a:fld id="{0670EBBD-4B13-4AD7-AFB5-92105DCF1B3C}" type="datetimeFigureOut">
               <a:rPr lang="pt-BR" smtClean="0"/>
-              <a:t>19/07/2014</a:t>
+              <a:pPr/>
+              <a:t>20/07/2014</a:t>
             </a:fld>
             <a:endParaRPr lang="pt-BR"/>
           </a:p>
@@ -2504,6 +2530,7 @@
           <a:p>
             <a:fld id="{A860C3A5-2856-48FF-86AF-DABF9B624B89}" type="slidenum">
               <a:rPr lang="pt-BR" smtClean="0"/>
+              <a:pPr/>
               <a:t>‹nº›</a:t>
             </a:fld>
             <a:endParaRPr lang="pt-BR"/>
@@ -2670,7 +2697,8 @@
           <a:p>
             <a:fld id="{0670EBBD-4B13-4AD7-AFB5-92105DCF1B3C}" type="datetimeFigureOut">
               <a:rPr lang="pt-BR" smtClean="0"/>
-              <a:t>19/07/2014</a:t>
+              <a:pPr/>
+              <a:t>20/07/2014</a:t>
             </a:fld>
             <a:endParaRPr lang="pt-BR"/>
           </a:p>
@@ -2748,6 +2776,7 @@
           <a:p>
             <a:fld id="{A860C3A5-2856-48FF-86AF-DABF9B624B89}" type="slidenum">
               <a:rPr lang="pt-BR" smtClean="0"/>
+              <a:pPr/>
               <a:t>‹nº›</a:t>
             </a:fld>
             <a:endParaRPr lang="pt-BR"/>
@@ -3090,6 +3119,169 @@
 </p:sld>
 </file>
 
+<file path=ppt/slides/slide10.xml><?xml version="1.0" encoding="utf-8"?>
+<p:sld xmlns:a="http://schemas.openxmlformats.org/drawingml/2006/main" xmlns:r="http://schemas.openxmlformats.org/officeDocument/2006/relationships" xmlns:p="http://schemas.openxmlformats.org/presentationml/2006/main">
+  <p:cSld>
+    <p:spTree>
+      <p:nvGrpSpPr>
+        <p:cNvPr id="1" name=""/>
+        <p:cNvGrpSpPr/>
+        <p:nvPr/>
+      </p:nvGrpSpPr>
+      <p:grpSpPr>
+        <a:xfrm>
+          <a:off x="0" y="0"/>
+          <a:ext cx="0" cy="0"/>
+          <a:chOff x="0" y="0"/>
+          <a:chExt cx="0" cy="0"/>
+        </a:xfrm>
+      </p:grpSpPr>
+      <p:sp>
+        <p:nvSpPr>
+          <p:cNvPr id="2" name="Título 1"/>
+          <p:cNvSpPr>
+            <a:spLocks noGrp="1"/>
+          </p:cNvSpPr>
+          <p:nvPr>
+            <p:ph type="title"/>
+          </p:nvPr>
+        </p:nvSpPr>
+        <p:spPr/>
+        <p:txBody>
+          <a:bodyPr/>
+          <a:lstStyle/>
+          <a:p>
+            <a:endParaRPr lang="pt-BR"/>
+          </a:p>
+        </p:txBody>
+      </p:sp>
+      <p:sp>
+        <p:nvSpPr>
+          <p:cNvPr id="3" name="Espaço Reservado para Conteúdo 2"/>
+          <p:cNvSpPr>
+            <a:spLocks noGrp="1"/>
+          </p:cNvSpPr>
+          <p:nvPr>
+            <p:ph idx="1"/>
+          </p:nvPr>
+        </p:nvSpPr>
+        <p:spPr/>
+        <p:txBody>
+          <a:bodyPr/>
+          <a:lstStyle/>
+          <a:p>
+            <a:endParaRPr lang="pt-BR"/>
+          </a:p>
+        </p:txBody>
+      </p:sp>
+      <p:pic>
+        <p:nvPicPr>
+          <p:cNvPr id="6146" name="Picture 2" descr="C:\Users\Usuário\Dropbox\_ORT\PR\SACI\usuarios.png"/>
+          <p:cNvPicPr>
+            <a:picLocks noChangeAspect="1" noChangeArrowheads="1"/>
+          </p:cNvPicPr>
+          <p:nvPr/>
+        </p:nvPicPr>
+        <p:blipFill>
+          <a:blip r:embed="rId2" cstate="print"/>
+          <a:srcRect/>
+          <a:stretch>
+            <a:fillRect/>
+          </a:stretch>
+        </p:blipFill>
+        <p:spPr bwMode="auto">
+          <a:xfrm>
+            <a:off x="165948" y="908720"/>
+            <a:ext cx="8835604" cy="4466444"/>
+          </a:xfrm>
+          <a:prstGeom prst="rect">
+            <a:avLst/>
+          </a:prstGeom>
+          <a:noFill/>
+        </p:spPr>
+      </p:pic>
+    </p:spTree>
+  </p:cSld>
+  <p:clrMapOvr>
+    <a:masterClrMapping/>
+  </p:clrMapOvr>
+</p:sld>
+</file>
+
+<file path=ppt/slides/slide11.xml><?xml version="1.0" encoding="utf-8"?>
+<p:sld xmlns:a="http://schemas.openxmlformats.org/drawingml/2006/main" xmlns:r="http://schemas.openxmlformats.org/officeDocument/2006/relationships" xmlns:p="http://schemas.openxmlformats.org/presentationml/2006/main">
+  <p:cSld>
+    <p:spTree>
+      <p:nvGrpSpPr>
+        <p:cNvPr id="1" name=""/>
+        <p:cNvGrpSpPr/>
+        <p:nvPr/>
+      </p:nvGrpSpPr>
+      <p:grpSpPr>
+        <a:xfrm>
+          <a:off x="0" y="0"/>
+          <a:ext cx="0" cy="0"/>
+          <a:chOff x="0" y="0"/>
+          <a:chExt cx="0" cy="0"/>
+        </a:xfrm>
+      </p:grpSpPr>
+      <p:sp>
+        <p:nvSpPr>
+          <p:cNvPr id="2" name="Título 1"/>
+          <p:cNvSpPr>
+            <a:spLocks noGrp="1"/>
+          </p:cNvSpPr>
+          <p:nvPr>
+            <p:ph type="title"/>
+          </p:nvPr>
+        </p:nvSpPr>
+        <p:spPr/>
+        <p:txBody>
+          <a:bodyPr/>
+          <a:lstStyle/>
+          <a:p>
+            <a:r>
+              <a:rPr lang="pt-BR" dirty="0" smtClean="0"/>
+              <a:t>Como queremos que fique?</a:t>
+            </a:r>
+            <a:endParaRPr lang="pt-BR" dirty="0"/>
+          </a:p>
+        </p:txBody>
+      </p:sp>
+      <p:pic>
+        <p:nvPicPr>
+          <p:cNvPr id="1027" name="Picture 3" descr="C:\Users\Usuário\Dropbox\_ORT\PR\SACI\SACI_pagina.jpg"/>
+          <p:cNvPicPr>
+            <a:picLocks noChangeAspect="1" noChangeArrowheads="1"/>
+          </p:cNvPicPr>
+          <p:nvPr/>
+        </p:nvPicPr>
+        <p:blipFill>
+          <a:blip r:embed="rId2" cstate="print"/>
+          <a:srcRect/>
+          <a:stretch>
+            <a:fillRect/>
+          </a:stretch>
+        </p:blipFill>
+        <p:spPr bwMode="auto">
+          <a:xfrm>
+            <a:off x="251520" y="1412776"/>
+            <a:ext cx="8616957" cy="4847039"/>
+          </a:xfrm>
+          <a:prstGeom prst="rect">
+            <a:avLst/>
+          </a:prstGeom>
+          <a:noFill/>
+        </p:spPr>
+      </p:pic>
+    </p:spTree>
+  </p:cSld>
+  <p:clrMapOvr>
+    <a:masterClrMapping/>
+  </p:clrMapOvr>
+</p:sld>
+</file>
+
 <file path=ppt/slides/slide2.xml><?xml version="1.0" encoding="utf-8"?>
 <p:sld xmlns:a="http://schemas.openxmlformats.org/drawingml/2006/main" xmlns:r="http://schemas.openxmlformats.org/officeDocument/2006/relationships" xmlns:p="http://schemas.openxmlformats.org/presentationml/2006/main">
   <p:cSld>
@@ -3394,7 +3586,34 @@
           <a:p>
             <a:r>
               <a:rPr lang="pt-BR" dirty="0" smtClean="0"/>
-              <a:t>Divisão por matéria de:</a:t>
+              <a:t>Divisão por matéria </a:t>
+            </a:r>
+            <a:r>
+              <a:rPr lang="pt-BR" dirty="0" smtClean="0"/>
+              <a:t>e por</a:t>
+            </a:r>
+            <a:r>
+              <a:rPr lang="pt-BR" dirty="0" smtClean="0"/>
+              <a:t>:</a:t>
+            </a:r>
+            <a:endParaRPr lang="pt-BR" dirty="0" smtClean="0"/>
+          </a:p>
+          <a:p>
+            <a:pPr lvl="1"/>
+            <a:r>
+              <a:rPr lang="pt-BR" dirty="0" smtClean="0"/>
+              <a:t>Arquivos</a:t>
+            </a:r>
+          </a:p>
+          <a:p>
+            <a:pPr lvl="1"/>
+            <a:r>
+              <a:rPr lang="pt-BR" dirty="0" smtClean="0"/>
+              <a:t>Fotos</a:t>
+            </a:r>
+            <a:r>
+              <a:rPr lang="pt-BR" dirty="0" smtClean="0"/>
+              <a:t>	</a:t>
             </a:r>
           </a:p>
           <a:p>
@@ -3403,24 +3622,7 @@
               <a:rPr lang="pt-BR" dirty="0" err="1" smtClean="0"/>
               <a:t>Posts</a:t>
             </a:r>
-            <a:r>
-              <a:rPr lang="pt-BR" dirty="0" smtClean="0"/>
-              <a:t>	</a:t>
-            </a:r>
-          </a:p>
-          <a:p>
-            <a:pPr lvl="1"/>
-            <a:r>
-              <a:rPr lang="pt-BR" dirty="0" smtClean="0"/>
-              <a:t>Arquivos</a:t>
-            </a:r>
-          </a:p>
-          <a:p>
-            <a:pPr lvl="1"/>
-            <a:r>
-              <a:rPr lang="pt-BR" dirty="0" smtClean="0"/>
-              <a:t>Fotos</a:t>
-            </a:r>
+            <a:endParaRPr lang="pt-BR" dirty="0" smtClean="0"/>
           </a:p>
           <a:p>
             <a:endParaRPr lang="pt-BR" dirty="0" smtClean="0"/>
@@ -3478,41 +3680,32 @@
           </a:p>
         </p:txBody>
       </p:sp>
-      <p:sp>
-        <p:nvSpPr>
-          <p:cNvPr id="3" name="Espaço Reservado para Conteúdo 2"/>
-          <p:cNvSpPr>
-            <a:spLocks noGrp="1"/>
-          </p:cNvSpPr>
-          <p:nvPr>
-            <p:ph idx="1"/>
-          </p:nvPr>
-        </p:nvSpPr>
-        <p:spPr/>
-        <p:txBody>
-          <a:bodyPr/>
-          <a:lstStyle/>
-          <a:p>
-            <a:r>
-              <a:rPr lang="pt-BR" dirty="0" smtClean="0"/>
-              <a:t>Colocar </a:t>
-            </a:r>
-            <a:r>
-              <a:rPr lang="pt-BR" dirty="0" err="1" smtClean="0"/>
-              <a:t>print</a:t>
-            </a:r>
-            <a:r>
-              <a:rPr lang="pt-BR" dirty="0" smtClean="0"/>
-              <a:t> das páginas </a:t>
-            </a:r>
-            <a:r>
-              <a:rPr lang="pt-BR" smtClean="0"/>
-              <a:t>que temos</a:t>
-            </a:r>
-            <a:endParaRPr lang="pt-BR" dirty="0"/>
-          </a:p>
-        </p:txBody>
-      </p:sp>
+      <p:pic>
+        <p:nvPicPr>
+          <p:cNvPr id="7170" name="Picture 2" descr="C:\Users\Usuário\Dropbox\_ORT\PR\SACI\home.png"/>
+          <p:cNvPicPr>
+            <a:picLocks noChangeAspect="1" noChangeArrowheads="1"/>
+          </p:cNvPicPr>
+          <p:nvPr/>
+        </p:nvPicPr>
+        <p:blipFill>
+          <a:blip r:embed="rId2" cstate="print"/>
+          <a:srcRect/>
+          <a:stretch>
+            <a:fillRect/>
+          </a:stretch>
+        </p:blipFill>
+        <p:spPr bwMode="auto">
+          <a:xfrm>
+            <a:off x="179512" y="1340768"/>
+            <a:ext cx="8820472" cy="5179391"/>
+          </a:xfrm>
+          <a:prstGeom prst="rect">
+            <a:avLst/>
+          </a:prstGeom>
+          <a:noFill/>
+        </p:spPr>
+      </p:pic>
     </p:spTree>
   </p:cSld>
   <p:clrMapOvr>
@@ -3553,11 +3746,7 @@
           <a:bodyPr/>
           <a:lstStyle/>
           <a:p>
-            <a:r>
-              <a:rPr lang="pt-BR" dirty="0" smtClean="0"/>
-              <a:t>Como queremos que fique?</a:t>
-            </a:r>
-            <a:endParaRPr lang="pt-BR" dirty="0"/>
+            <a:endParaRPr lang="pt-BR"/>
           </a:p>
         </p:txBody>
       </p:sp>
@@ -3576,22 +3765,303 @@
           <a:bodyPr/>
           <a:lstStyle/>
           <a:p>
-            <a:r>
-              <a:rPr lang="pt-BR" dirty="0" smtClean="0"/>
-              <a:t>Eu ou você pode fazer um esboço no </a:t>
-            </a:r>
-            <a:r>
-              <a:rPr lang="pt-BR" dirty="0" err="1" smtClean="0"/>
-              <a:t>photoshop</a:t>
-            </a:r>
-            <a:r>
-              <a:rPr lang="pt-BR" dirty="0" smtClean="0"/>
-              <a:t> sobre como imaginamos quarta</a:t>
-            </a:r>
-            <a:endParaRPr lang="pt-BR" dirty="0"/>
-          </a:p>
-        </p:txBody>
-      </p:sp>
+            <a:endParaRPr lang="pt-BR"/>
+          </a:p>
+        </p:txBody>
+      </p:sp>
+      <p:pic>
+        <p:nvPicPr>
+          <p:cNvPr id="2050" name="Picture 2" descr="C:\Users\Usuário\Dropbox\_ORT\PR\SACI\cadastro.png"/>
+          <p:cNvPicPr>
+            <a:picLocks noChangeAspect="1" noChangeArrowheads="1"/>
+          </p:cNvPicPr>
+          <p:nvPr/>
+        </p:nvPicPr>
+        <p:blipFill>
+          <a:blip r:embed="rId2" cstate="print"/>
+          <a:srcRect/>
+          <a:stretch>
+            <a:fillRect/>
+          </a:stretch>
+        </p:blipFill>
+        <p:spPr bwMode="auto">
+          <a:xfrm>
+            <a:off x="107504" y="908720"/>
+            <a:ext cx="8902671" cy="4509120"/>
+          </a:xfrm>
+          <a:prstGeom prst="rect">
+            <a:avLst/>
+          </a:prstGeom>
+          <a:noFill/>
+        </p:spPr>
+      </p:pic>
+    </p:spTree>
+  </p:cSld>
+  <p:clrMapOvr>
+    <a:masterClrMapping/>
+  </p:clrMapOvr>
+</p:sld>
+</file>
+
+<file path=ppt/slides/slide7.xml><?xml version="1.0" encoding="utf-8"?>
+<p:sld xmlns:a="http://schemas.openxmlformats.org/drawingml/2006/main" xmlns:r="http://schemas.openxmlformats.org/officeDocument/2006/relationships" xmlns:p="http://schemas.openxmlformats.org/presentationml/2006/main">
+  <p:cSld>
+    <p:spTree>
+      <p:nvGrpSpPr>
+        <p:cNvPr id="1" name=""/>
+        <p:cNvGrpSpPr/>
+        <p:nvPr/>
+      </p:nvGrpSpPr>
+      <p:grpSpPr>
+        <a:xfrm>
+          <a:off x="0" y="0"/>
+          <a:ext cx="0" cy="0"/>
+          <a:chOff x="0" y="0"/>
+          <a:chExt cx="0" cy="0"/>
+        </a:xfrm>
+      </p:grpSpPr>
+      <p:sp>
+        <p:nvSpPr>
+          <p:cNvPr id="2" name="Título 1"/>
+          <p:cNvSpPr>
+            <a:spLocks noGrp="1"/>
+          </p:cNvSpPr>
+          <p:nvPr>
+            <p:ph type="title"/>
+          </p:nvPr>
+        </p:nvSpPr>
+        <p:spPr/>
+        <p:txBody>
+          <a:bodyPr/>
+          <a:lstStyle/>
+          <a:p>
+            <a:endParaRPr lang="pt-BR"/>
+          </a:p>
+        </p:txBody>
+      </p:sp>
+      <p:sp>
+        <p:nvSpPr>
+          <p:cNvPr id="3" name="Espaço Reservado para Conteúdo 2"/>
+          <p:cNvSpPr>
+            <a:spLocks noGrp="1"/>
+          </p:cNvSpPr>
+          <p:nvPr>
+            <p:ph idx="1"/>
+          </p:nvPr>
+        </p:nvSpPr>
+        <p:spPr/>
+        <p:txBody>
+          <a:bodyPr/>
+          <a:lstStyle/>
+          <a:p>
+            <a:endParaRPr lang="pt-BR"/>
+          </a:p>
+        </p:txBody>
+      </p:sp>
+      <p:pic>
+        <p:nvPicPr>
+          <p:cNvPr id="3074" name="Picture 2" descr="C:\Users\Usuário\Dropbox\_ORT\PR\SACI\entrar.png"/>
+          <p:cNvPicPr>
+            <a:picLocks noChangeAspect="1" noChangeArrowheads="1"/>
+          </p:cNvPicPr>
+          <p:nvPr/>
+        </p:nvPicPr>
+        <p:blipFill>
+          <a:blip r:embed="rId2" cstate="print"/>
+          <a:srcRect/>
+          <a:stretch>
+            <a:fillRect/>
+          </a:stretch>
+        </p:blipFill>
+        <p:spPr bwMode="auto">
+          <a:xfrm>
+            <a:off x="107504" y="908720"/>
+            <a:ext cx="8864235" cy="4480918"/>
+          </a:xfrm>
+          <a:prstGeom prst="rect">
+            <a:avLst/>
+          </a:prstGeom>
+          <a:noFill/>
+        </p:spPr>
+      </p:pic>
+    </p:spTree>
+  </p:cSld>
+  <p:clrMapOvr>
+    <a:masterClrMapping/>
+  </p:clrMapOvr>
+</p:sld>
+</file>
+
+<file path=ppt/slides/slide8.xml><?xml version="1.0" encoding="utf-8"?>
+<p:sld xmlns:a="http://schemas.openxmlformats.org/drawingml/2006/main" xmlns:r="http://schemas.openxmlformats.org/officeDocument/2006/relationships" xmlns:p="http://schemas.openxmlformats.org/presentationml/2006/main">
+  <p:cSld>
+    <p:spTree>
+      <p:nvGrpSpPr>
+        <p:cNvPr id="1" name=""/>
+        <p:cNvGrpSpPr/>
+        <p:nvPr/>
+      </p:nvGrpSpPr>
+      <p:grpSpPr>
+        <a:xfrm>
+          <a:off x="0" y="0"/>
+          <a:ext cx="0" cy="0"/>
+          <a:chOff x="0" y="0"/>
+          <a:chExt cx="0" cy="0"/>
+        </a:xfrm>
+      </p:grpSpPr>
+      <p:sp>
+        <p:nvSpPr>
+          <p:cNvPr id="2" name="Título 1"/>
+          <p:cNvSpPr>
+            <a:spLocks noGrp="1"/>
+          </p:cNvSpPr>
+          <p:nvPr>
+            <p:ph type="title"/>
+          </p:nvPr>
+        </p:nvSpPr>
+        <p:spPr/>
+        <p:txBody>
+          <a:bodyPr/>
+          <a:lstStyle/>
+          <a:p>
+            <a:endParaRPr lang="pt-BR"/>
+          </a:p>
+        </p:txBody>
+      </p:sp>
+      <p:sp>
+        <p:nvSpPr>
+          <p:cNvPr id="3" name="Espaço Reservado para Conteúdo 2"/>
+          <p:cNvSpPr>
+            <a:spLocks noGrp="1"/>
+          </p:cNvSpPr>
+          <p:nvPr>
+            <p:ph idx="1"/>
+          </p:nvPr>
+        </p:nvSpPr>
+        <p:spPr/>
+        <p:txBody>
+          <a:bodyPr/>
+          <a:lstStyle/>
+          <a:p>
+            <a:endParaRPr lang="pt-BR"/>
+          </a:p>
+        </p:txBody>
+      </p:sp>
+      <p:pic>
+        <p:nvPicPr>
+          <p:cNvPr id="4098" name="Picture 2" descr="C:\Users\Usuário\Dropbox\_ORT\PR\SACI\perfil.png"/>
+          <p:cNvPicPr>
+            <a:picLocks noChangeAspect="1" noChangeArrowheads="1"/>
+          </p:cNvPicPr>
+          <p:nvPr/>
+        </p:nvPicPr>
+        <p:blipFill>
+          <a:blip r:embed="rId2" cstate="print"/>
+          <a:srcRect/>
+          <a:stretch>
+            <a:fillRect/>
+          </a:stretch>
+        </p:blipFill>
+        <p:spPr bwMode="auto">
+          <a:xfrm>
+            <a:off x="107504" y="908720"/>
+            <a:ext cx="8856984" cy="4483045"/>
+          </a:xfrm>
+          <a:prstGeom prst="rect">
+            <a:avLst/>
+          </a:prstGeom>
+          <a:noFill/>
+        </p:spPr>
+      </p:pic>
+    </p:spTree>
+  </p:cSld>
+  <p:clrMapOvr>
+    <a:masterClrMapping/>
+  </p:clrMapOvr>
+</p:sld>
+</file>
+
+<file path=ppt/slides/slide9.xml><?xml version="1.0" encoding="utf-8"?>
+<p:sld xmlns:a="http://schemas.openxmlformats.org/drawingml/2006/main" xmlns:r="http://schemas.openxmlformats.org/officeDocument/2006/relationships" xmlns:p="http://schemas.openxmlformats.org/presentationml/2006/main">
+  <p:cSld>
+    <p:spTree>
+      <p:nvGrpSpPr>
+        <p:cNvPr id="1" name=""/>
+        <p:cNvGrpSpPr/>
+        <p:nvPr/>
+      </p:nvGrpSpPr>
+      <p:grpSpPr>
+        <a:xfrm>
+          <a:off x="0" y="0"/>
+          <a:ext cx="0" cy="0"/>
+          <a:chOff x="0" y="0"/>
+          <a:chExt cx="0" cy="0"/>
+        </a:xfrm>
+      </p:grpSpPr>
+      <p:sp>
+        <p:nvSpPr>
+          <p:cNvPr id="2" name="Título 1"/>
+          <p:cNvSpPr>
+            <a:spLocks noGrp="1"/>
+          </p:cNvSpPr>
+          <p:nvPr>
+            <p:ph type="title"/>
+          </p:nvPr>
+        </p:nvSpPr>
+        <p:spPr/>
+        <p:txBody>
+          <a:bodyPr/>
+          <a:lstStyle/>
+          <a:p>
+            <a:endParaRPr lang="pt-BR"/>
+          </a:p>
+        </p:txBody>
+      </p:sp>
+      <p:sp>
+        <p:nvSpPr>
+          <p:cNvPr id="3" name="Espaço Reservado para Conteúdo 2"/>
+          <p:cNvSpPr>
+            <a:spLocks noGrp="1"/>
+          </p:cNvSpPr>
+          <p:nvPr>
+            <p:ph idx="1"/>
+          </p:nvPr>
+        </p:nvSpPr>
+        <p:spPr/>
+        <p:txBody>
+          <a:bodyPr/>
+          <a:lstStyle/>
+          <a:p>
+            <a:endParaRPr lang="pt-BR"/>
+          </a:p>
+        </p:txBody>
+      </p:sp>
+      <p:pic>
+        <p:nvPicPr>
+          <p:cNvPr id="5122" name="Picture 2" descr="C:\Users\Usuário\Dropbox\_ORT\PR\SACI\postar.png"/>
+          <p:cNvPicPr>
+            <a:picLocks noChangeAspect="1" noChangeArrowheads="1"/>
+          </p:cNvPicPr>
+          <p:nvPr/>
+        </p:nvPicPr>
+        <p:blipFill>
+          <a:blip r:embed="rId2" cstate="print"/>
+          <a:srcRect/>
+          <a:stretch>
+            <a:fillRect/>
+          </a:stretch>
+        </p:blipFill>
+        <p:spPr bwMode="auto">
+          <a:xfrm>
+            <a:off x="107504" y="908720"/>
+            <a:ext cx="8892480" cy="4495194"/>
+          </a:xfrm>
+          <a:prstGeom prst="rect">
+            <a:avLst/>
+          </a:prstGeom>
+          <a:noFill/>
+        </p:spPr>
+      </p:pic>
     </p:spTree>
   </p:cSld>
   <p:clrMapOvr>

</xml_diff>